<commit_message>
Update Develop a security strategy that works.pptx
</commit_message>
<xml_diff>
--- a/2019-06 - Experts Live NL/Develop a security strategy that works.pptx
+++ b/2019-06 - Experts Live NL/Develop a security strategy that works.pptx
@@ -1086,7 +1086,7 @@
   <pc:docChgLst>
     <pc:chgData name="Michael Van Horenbeeck" userId="6078a54e-22e3-489b-9561-c1291828334e" providerId="ADAL" clId="{4D1BF3FE-658D-4B72-9BD9-7712CCD148EA}"/>
     <pc:docChg chg="modSld">
-      <pc:chgData name="Michael Van Horenbeeck" userId="6078a54e-22e3-489b-9561-c1291828334e" providerId="ADAL" clId="{4D1BF3FE-658D-4B72-9BD9-7712CCD148EA}" dt="2019-06-12T06:21:50.384" v="0" actId="20577"/>
+      <pc:chgData name="Michael Van Horenbeeck" userId="6078a54e-22e3-489b-9561-c1291828334e" providerId="ADAL" clId="{4D1BF3FE-658D-4B72-9BD9-7712CCD148EA}" dt="2019-06-12T06:29:16.974" v="30" actId="20577"/>
       <pc:docMkLst>
         <pc:docMk/>
       </pc:docMkLst>
@@ -1095,6 +1095,13 @@
         <pc:sldMkLst>
           <pc:docMk/>
           <pc:sldMk cId="1529868269" sldId="275"/>
+        </pc:sldMkLst>
+      </pc:sldChg>
+      <pc:sldChg chg="modNotesTx">
+        <pc:chgData name="Michael Van Horenbeeck" userId="6078a54e-22e3-489b-9561-c1291828334e" providerId="ADAL" clId="{4D1BF3FE-658D-4B72-9BD9-7712CCD148EA}" dt="2019-06-12T06:29:16.974" v="30" actId="20577"/>
+        <pc:sldMkLst>
+          <pc:docMk/>
+          <pc:sldMk cId="1510765733" sldId="309"/>
         </pc:sldMkLst>
       </pc:sldChg>
     </pc:docChg>
@@ -2191,6 +2198,94 @@
 </file>
 
 <file path=ppt/notesSlides/notesSlide7.xml><?xml version="1.0" encoding="utf-8"?>
+<p:notes xmlns:a="http://schemas.openxmlformats.org/drawingml/2006/main" xmlns:r="http://schemas.openxmlformats.org/officeDocument/2006/relationships" xmlns:p="http://schemas.openxmlformats.org/presentationml/2006/main">
+  <p:cSld>
+    <p:spTree>
+      <p:nvGrpSpPr>
+        <p:cNvPr id="1" name=""/>
+        <p:cNvGrpSpPr/>
+        <p:nvPr/>
+      </p:nvGrpSpPr>
+      <p:grpSpPr>
+        <a:xfrm>
+          <a:off x="0" y="0"/>
+          <a:ext cx="0" cy="0"/>
+          <a:chOff x="0" y="0"/>
+          <a:chExt cx="0" cy="0"/>
+        </a:xfrm>
+      </p:grpSpPr>
+      <p:sp>
+        <p:nvSpPr>
+          <p:cNvPr id="2" name="Slide Image Placeholder 1"/>
+          <p:cNvSpPr>
+            <a:spLocks noGrp="1" noRot="1" noChangeAspect="1"/>
+          </p:cNvSpPr>
+          <p:nvPr>
+            <p:ph type="sldImg"/>
+          </p:nvPr>
+        </p:nvSpPr>
+        <p:spPr/>
+      </p:sp>
+      <p:sp>
+        <p:nvSpPr>
+          <p:cNvPr id="3" name="Notes Placeholder 2"/>
+          <p:cNvSpPr>
+            <a:spLocks noGrp="1"/>
+          </p:cNvSpPr>
+          <p:nvPr>
+            <p:ph type="body" idx="1"/>
+          </p:nvPr>
+        </p:nvSpPr>
+        <p:spPr/>
+        <p:txBody>
+          <a:bodyPr/>
+          <a:lstStyle/>
+          <a:p>
+            <a:r>
+              <a:rPr lang="nl-BE"/>
+              <a:t>Image courtesy of Microsoft.</a:t>
+            </a:r>
+            <a:endParaRPr lang="en-BE"/>
+          </a:p>
+        </p:txBody>
+      </p:sp>
+      <p:sp>
+        <p:nvSpPr>
+          <p:cNvPr id="4" name="Slide Number Placeholder 3"/>
+          <p:cNvSpPr>
+            <a:spLocks noGrp="1"/>
+          </p:cNvSpPr>
+          <p:nvPr>
+            <p:ph type="sldNum" sz="quarter" idx="10"/>
+          </p:nvPr>
+        </p:nvSpPr>
+        <p:spPr/>
+        <p:txBody>
+          <a:bodyPr/>
+          <a:lstStyle/>
+          <a:p>
+            <a:fld id="{BB9CE69C-86FB-4912-B2C8-39543EA269DD}" type="slidenum">
+              <a:rPr lang="en-BE" smtClean="0"/>
+              <a:t>16</a:t>
+            </a:fld>
+            <a:endParaRPr lang="en-BE"/>
+          </a:p>
+        </p:txBody>
+      </p:sp>
+    </p:spTree>
+    <p:extLst>
+      <p:ext uri="{BB962C8B-B14F-4D97-AF65-F5344CB8AC3E}">
+        <p14:creationId xmlns:p14="http://schemas.microsoft.com/office/powerpoint/2010/main" val="297803173"/>
+      </p:ext>
+    </p:extLst>
+  </p:cSld>
+  <p:clrMapOvr>
+    <a:masterClrMapping/>
+  </p:clrMapOvr>
+</p:notes>
+</file>
+
+<file path=ppt/notesSlides/notesSlide8.xml><?xml version="1.0" encoding="utf-8"?>
 <p:notes xmlns:a="http://schemas.openxmlformats.org/drawingml/2006/main" xmlns:r="http://schemas.openxmlformats.org/officeDocument/2006/relationships" xmlns:p="http://schemas.openxmlformats.org/presentationml/2006/main">
   <p:cSld>
     <p:spTree>
@@ -6022,7 +6117,7 @@
           <p:nvPr/>
         </p:nvPicPr>
         <p:blipFill>
-          <a:blip r:embed="rId2"/>
+          <a:blip r:embed="rId3"/>
           <a:stretch>
             <a:fillRect/>
           </a:stretch>
@@ -17107,15 +17202,6 @@
 </file>
 
 <file path=customXml/item1.xml><?xml version="1.0" encoding="utf-8"?>
-<?mso-contentType ?>
-<FormTemplates xmlns="http://schemas.microsoft.com/sharepoint/v3/contenttype/forms">
-  <Display>DocumentLibraryForm</Display>
-  <Edit>DocumentLibraryForm</Edit>
-  <New>DocumentLibraryForm</New>
-</FormTemplates>
-</file>
-
-<file path=customXml/item2.xml><?xml version="1.0" encoding="utf-8"?>
 <ct:contentTypeSchema xmlns:ct="http://schemas.microsoft.com/office/2006/metadata/contentType" xmlns:ma="http://schemas.microsoft.com/office/2006/metadata/properties/metaAttributes" ct:_="" ma:_="" ma:contentTypeName="Document" ma:contentTypeID="0x01010097CD65CADBD20F44B823D3A456FEF9B1" ma:contentTypeVersion="8" ma:contentTypeDescription="Een nieuw document maken." ma:contentTypeScope="" ma:versionID="7ea61b0379bedff1a1822fd367d1253e">
   <xsd:schema xmlns:xsd="http://www.w3.org/2001/XMLSchema" xmlns:xs="http://www.w3.org/2001/XMLSchema" xmlns:p="http://schemas.microsoft.com/office/2006/metadata/properties" xmlns:ns2="5891958d-2370-4526-82cd-f303136956a2" xmlns:ns3="042fe71a-d378-40e6-b588-f343e11f8b3b" targetNamespace="http://schemas.microsoft.com/office/2006/metadata/properties" ma:root="true" ma:fieldsID="efb14b32357b5daac7b568b07c65d59c" ns2:_="" ns3:_="">
     <xsd:import namespace="5891958d-2370-4526-82cd-f303136956a2"/>
@@ -17306,21 +17392,22 @@
 </ct:contentTypeSchema>
 </file>
 
-<file path=customXml/item3.xml><?xml version="1.0" encoding="utf-8"?>
+<file path=customXml/item2.xml><?xml version="1.0" encoding="utf-8"?>
 <p:properties xmlns:p="http://schemas.microsoft.com/office/2006/metadata/properties" xmlns:xsi="http://www.w3.org/2001/XMLSchema-instance" xmlns:pc="http://schemas.microsoft.com/office/infopath/2007/PartnerControls">
   <documentManagement/>
 </p:properties>
 </file>
 
-<file path=customXml/itemProps1.xml><?xml version="1.0" encoding="utf-8"?>
-<ds:datastoreItem xmlns:ds="http://schemas.openxmlformats.org/officeDocument/2006/customXml" ds:itemID="{7A9B7B23-1709-4556-9982-9EC72D5CC662}">
-  <ds:schemaRefs>
-    <ds:schemaRef ds:uri="http://schemas.microsoft.com/sharepoint/v3/contenttype/forms"/>
-  </ds:schemaRefs>
-</ds:datastoreItem>
+<file path=customXml/item3.xml><?xml version="1.0" encoding="utf-8"?>
+<?mso-contentType ?>
+<FormTemplates xmlns="http://schemas.microsoft.com/sharepoint/v3/contenttype/forms">
+  <Display>DocumentLibraryForm</Display>
+  <Edit>DocumentLibraryForm</Edit>
+  <New>DocumentLibraryForm</New>
+</FormTemplates>
 </file>
 
-<file path=customXml/itemProps2.xml><?xml version="1.0" encoding="utf-8"?>
+<file path=customXml/itemProps1.xml><?xml version="1.0" encoding="utf-8"?>
 <ds:datastoreItem xmlns:ds="http://schemas.openxmlformats.org/officeDocument/2006/customXml" ds:itemID="{AA5056C7-E5D9-4018-9959-CB1859AEB8F6}">
   <ds:schemaRefs>
     <ds:schemaRef ds:uri="http://schemas.microsoft.com/office/2006/metadata/contentType"/>
@@ -17339,19 +17426,27 @@
 </ds:datastoreItem>
 </file>
 
-<file path=customXml/itemProps3.xml><?xml version="1.0" encoding="utf-8"?>
+<file path=customXml/itemProps2.xml><?xml version="1.0" encoding="utf-8"?>
 <ds:datastoreItem xmlns:ds="http://schemas.openxmlformats.org/officeDocument/2006/customXml" ds:itemID="{A654F861-8F64-4BE9-A2C4-C6E39A5BFE06}">
   <ds:schemaRefs>
-    <ds:schemaRef ds:uri="http://schemas.microsoft.com/office/2006/metadata/properties"/>
-    <ds:schemaRef ds:uri="http://purl.org/dc/dcmitype/"/>
     <ds:schemaRef ds:uri="http://purl.org/dc/terms/"/>
+    <ds:schemaRef ds:uri="http://purl.org/dc/elements/1.1/"/>
     <ds:schemaRef ds:uri="http://schemas.microsoft.com/office/2006/documentManagement/types"/>
+    <ds:schemaRef ds:uri="042fe71a-d378-40e6-b588-f343e11f8b3b"/>
     <ds:schemaRef ds:uri="http://schemas.microsoft.com/office/infopath/2007/PartnerControls"/>
     <ds:schemaRef ds:uri="5891958d-2370-4526-82cd-f303136956a2"/>
-    <ds:schemaRef ds:uri="042fe71a-d378-40e6-b588-f343e11f8b3b"/>
-    <ds:schemaRef ds:uri="http://purl.org/dc/elements/1.1/"/>
+    <ds:schemaRef ds:uri="http://purl.org/dc/dcmitype/"/>
+    <ds:schemaRef ds:uri="http://www.w3.org/XML/1998/namespace"/>
     <ds:schemaRef ds:uri="http://schemas.openxmlformats.org/package/2006/metadata/core-properties"/>
-    <ds:schemaRef ds:uri="http://www.w3.org/XML/1998/namespace"/>
+    <ds:schemaRef ds:uri="http://schemas.microsoft.com/office/2006/metadata/properties"/>
+  </ds:schemaRefs>
+</ds:datastoreItem>
+</file>
+
+<file path=customXml/itemProps3.xml><?xml version="1.0" encoding="utf-8"?>
+<ds:datastoreItem xmlns:ds="http://schemas.openxmlformats.org/officeDocument/2006/customXml" ds:itemID="{7A9B7B23-1709-4556-9982-9EC72D5CC662}">
+  <ds:schemaRefs>
+    <ds:schemaRef ds:uri="http://schemas.microsoft.com/sharepoint/v3/contenttype/forms"/>
   </ds:schemaRefs>
 </ds:datastoreItem>
 </file>
</xml_diff>